<commit_message>
Added Documentation images & Silkscreen design
</commit_message>
<xml_diff>
--- a/Documentation/Silkscreen/Design.pptx
+++ b/Documentation/Silkscreen/Design.pptx
@@ -8,7 +8,7 @@
     <p:sldId id="258" r:id="rId2"/>
     <p:sldId id="256" r:id="rId3"/>
     <p:sldId id="261" r:id="rId4"/>
-    <p:sldId id="262" r:id="rId5"/>
+    <p:sldId id="264" r:id="rId5"/>
     <p:sldId id="263" r:id="rId6"/>
   </p:sldIdLst>
   <p:sldSz cx="7199313" cy="7199313"/>
@@ -247,7 +247,7 @@
           <a:p>
             <a:fld id="{DB89F38B-51E1-4C90-A834-FCA36791B729}" type="datetimeFigureOut">
               <a:rPr lang="es-ES" smtClean="0"/>
-              <a:t>26/03/2022</a:t>
+              <a:t>29/03/2022</a:t>
             </a:fld>
             <a:endParaRPr lang="es-ES"/>
           </a:p>
@@ -417,7 +417,7 @@
           <a:p>
             <a:fld id="{DB89F38B-51E1-4C90-A834-FCA36791B729}" type="datetimeFigureOut">
               <a:rPr lang="es-ES" smtClean="0"/>
-              <a:t>26/03/2022</a:t>
+              <a:t>29/03/2022</a:t>
             </a:fld>
             <a:endParaRPr lang="es-ES"/>
           </a:p>
@@ -597,7 +597,7 @@
           <a:p>
             <a:fld id="{DB89F38B-51E1-4C90-A834-FCA36791B729}" type="datetimeFigureOut">
               <a:rPr lang="es-ES" smtClean="0"/>
-              <a:t>26/03/2022</a:t>
+              <a:t>29/03/2022</a:t>
             </a:fld>
             <a:endParaRPr lang="es-ES"/>
           </a:p>
@@ -767,7 +767,7 @@
           <a:p>
             <a:fld id="{DB89F38B-51E1-4C90-A834-FCA36791B729}" type="datetimeFigureOut">
               <a:rPr lang="es-ES" smtClean="0"/>
-              <a:t>26/03/2022</a:t>
+              <a:t>29/03/2022</a:t>
             </a:fld>
             <a:endParaRPr lang="es-ES"/>
           </a:p>
@@ -1011,7 +1011,7 @@
           <a:p>
             <a:fld id="{DB89F38B-51E1-4C90-A834-FCA36791B729}" type="datetimeFigureOut">
               <a:rPr lang="es-ES" smtClean="0"/>
-              <a:t>26/03/2022</a:t>
+              <a:t>29/03/2022</a:t>
             </a:fld>
             <a:endParaRPr lang="es-ES"/>
           </a:p>
@@ -1243,7 +1243,7 @@
           <a:p>
             <a:fld id="{DB89F38B-51E1-4C90-A834-FCA36791B729}" type="datetimeFigureOut">
               <a:rPr lang="es-ES" smtClean="0"/>
-              <a:t>26/03/2022</a:t>
+              <a:t>29/03/2022</a:t>
             </a:fld>
             <a:endParaRPr lang="es-ES"/>
           </a:p>
@@ -1610,7 +1610,7 @@
           <a:p>
             <a:fld id="{DB89F38B-51E1-4C90-A834-FCA36791B729}" type="datetimeFigureOut">
               <a:rPr lang="es-ES" smtClean="0"/>
-              <a:t>26/03/2022</a:t>
+              <a:t>29/03/2022</a:t>
             </a:fld>
             <a:endParaRPr lang="es-ES"/>
           </a:p>
@@ -1728,7 +1728,7 @@
           <a:p>
             <a:fld id="{DB89F38B-51E1-4C90-A834-FCA36791B729}" type="datetimeFigureOut">
               <a:rPr lang="es-ES" smtClean="0"/>
-              <a:t>26/03/2022</a:t>
+              <a:t>29/03/2022</a:t>
             </a:fld>
             <a:endParaRPr lang="es-ES"/>
           </a:p>
@@ -1823,7 +1823,7 @@
           <a:p>
             <a:fld id="{DB89F38B-51E1-4C90-A834-FCA36791B729}" type="datetimeFigureOut">
               <a:rPr lang="es-ES" smtClean="0"/>
-              <a:t>26/03/2022</a:t>
+              <a:t>29/03/2022</a:t>
             </a:fld>
             <a:endParaRPr lang="es-ES"/>
           </a:p>
@@ -2100,7 +2100,7 @@
           <a:p>
             <a:fld id="{DB89F38B-51E1-4C90-A834-FCA36791B729}" type="datetimeFigureOut">
               <a:rPr lang="es-ES" smtClean="0"/>
-              <a:t>26/03/2022</a:t>
+              <a:t>29/03/2022</a:t>
             </a:fld>
             <a:endParaRPr lang="es-ES"/>
           </a:p>
@@ -2357,7 +2357,7 @@
           <a:p>
             <a:fld id="{DB89F38B-51E1-4C90-A834-FCA36791B729}" type="datetimeFigureOut">
               <a:rPr lang="es-ES" smtClean="0"/>
-              <a:t>26/03/2022</a:t>
+              <a:t>29/03/2022</a:t>
             </a:fld>
             <a:endParaRPr lang="es-ES"/>
           </a:p>
@@ -2570,7 +2570,7 @@
           <a:p>
             <a:fld id="{DB89F38B-51E1-4C90-A834-FCA36791B729}" type="datetimeFigureOut">
               <a:rPr lang="es-ES" smtClean="0"/>
-              <a:t>26/03/2022</a:t>
+              <a:t>29/03/2022</a:t>
             </a:fld>
             <a:endParaRPr lang="es-ES"/>
           </a:p>
@@ -3003,7 +3003,7 @@
           <a:graphicData uri="http://schemas.openxmlformats.org/presentationml/2006/ole">
             <mc:AlternateContent xmlns:mc="http://schemas.openxmlformats.org/markup-compatibility/2006">
               <mc:Choice xmlns:v="urn:schemas-microsoft-com:vml" Requires="v">
-                <p:oleObj spid="_x0000_s1029" name="Worksheet" r:id="rId3" imgW="5629218" imgH="3248059" progId="Excel.Sheet.12">
+                <p:oleObj spid="_x0000_s1030" name="Worksheet" r:id="rId3" imgW="5629218" imgH="3248059" progId="Excel.Sheet.12">
                   <p:embed/>
                 </p:oleObj>
               </mc:Choice>
@@ -3070,10 +3070,10 @@
       </p:grpSpPr>
       <p:pic>
         <p:nvPicPr>
-          <p:cNvPr id="4" name="Imagen 3">
+          <p:cNvPr id="3" name="Imagen 2">
             <a:extLst>
               <a:ext uri="{FF2B5EF4-FFF2-40B4-BE49-F238E27FC236}">
-                <a16:creationId xmlns:a16="http://schemas.microsoft.com/office/drawing/2014/main" id="{1E6BADA0-4F9D-41F2-9688-E04520FB0674}"/>
+                <a16:creationId xmlns:a16="http://schemas.microsoft.com/office/drawing/2014/main" id="{4DF1442F-1209-4BD4-AD39-C1C20EC3098A}"/>
               </a:ext>
             </a:extLst>
           </p:cNvPr>
@@ -3094,6 +3094,11 @@
                 </a:srgbClr>
               </a:clrTo>
             </a:clrChange>
+            <a:extLst>
+              <a:ext uri="{28A0092B-C50C-407E-A947-70E740481C1C}">
+                <a14:useLocalDpi xmlns:a14="http://schemas.microsoft.com/office/drawing/2010/main" val="0"/>
+              </a:ext>
+            </a:extLst>
           </a:blip>
           <a:stretch>
             <a:fillRect/>
@@ -3101,8 +3106,8 @@
         </p:blipFill>
         <p:spPr>
           <a:xfrm>
-            <a:off x="1256145" y="-1382"/>
-            <a:ext cx="4668132" cy="7191447"/>
+            <a:off x="1267777" y="0"/>
+            <a:ext cx="4663759" cy="7199313"/>
           </a:xfrm>
           <a:prstGeom prst="rect">
             <a:avLst/>
@@ -4536,6 +4541,44 @@
           </p:spPr>
         </p:pic>
       </p:grpSp>
+      <p:sp>
+        <p:nvSpPr>
+          <p:cNvPr id="43" name="CuadroTexto 42">
+            <a:extLst>
+              <a:ext uri="{FF2B5EF4-FFF2-40B4-BE49-F238E27FC236}">
+                <a16:creationId xmlns:a16="http://schemas.microsoft.com/office/drawing/2014/main" id="{12A164A5-9DC6-425B-B073-F962797753F6}"/>
+              </a:ext>
+            </a:extLst>
+          </p:cNvPr>
+          <p:cNvSpPr txBox="1"/>
+          <p:nvPr/>
+        </p:nvSpPr>
+        <p:spPr>
+          <a:xfrm>
+            <a:off x="2842259" y="3179369"/>
+            <a:ext cx="1499201" cy="338554"/>
+          </a:xfrm>
+          <a:prstGeom prst="rect">
+            <a:avLst/>
+          </a:prstGeom>
+          <a:noFill/>
+        </p:spPr>
+        <p:txBody>
+          <a:bodyPr wrap="square" rtlCol="0">
+            <a:spAutoFit/>
+          </a:bodyPr>
+          <a:lstStyle/>
+          <a:p>
+            <a:pPr algn="ctr"/>
+            <a:r>
+              <a:rPr lang="es-ES" sz="1600" b="1" dirty="0">
+                <a:latin typeface="Audiowide" panose="02000503000000020004" pitchFamily="2" charset="0"/>
+              </a:rPr>
+              <a:t>IMU Module</a:t>
+            </a:r>
+          </a:p>
+        </p:txBody>
+      </p:sp>
     </p:spTree>
     <p:extLst>
       <p:ext uri="{BB962C8B-B14F-4D97-AF65-F5344CB8AC3E}">
@@ -6405,10 +6448,48 @@
           </p:spPr>
         </p:pic>
       </p:grpSp>
+      <p:sp>
+        <p:nvSpPr>
+          <p:cNvPr id="43" name="CuadroTexto 42">
+            <a:extLst>
+              <a:ext uri="{FF2B5EF4-FFF2-40B4-BE49-F238E27FC236}">
+                <a16:creationId xmlns:a16="http://schemas.microsoft.com/office/drawing/2014/main" id="{12A164A5-9DC6-425B-B073-F962797753F6}"/>
+              </a:ext>
+            </a:extLst>
+          </p:cNvPr>
+          <p:cNvSpPr txBox="1"/>
+          <p:nvPr/>
+        </p:nvSpPr>
+        <p:spPr>
+          <a:xfrm>
+            <a:off x="2842259" y="3179369"/>
+            <a:ext cx="1499201" cy="338554"/>
+          </a:xfrm>
+          <a:prstGeom prst="rect">
+            <a:avLst/>
+          </a:prstGeom>
+          <a:noFill/>
+        </p:spPr>
+        <p:txBody>
+          <a:bodyPr wrap="square" rtlCol="0">
+            <a:spAutoFit/>
+          </a:bodyPr>
+          <a:lstStyle/>
+          <a:p>
+            <a:pPr algn="ctr"/>
+            <a:r>
+              <a:rPr lang="es-ES" sz="1600" b="1" dirty="0">
+                <a:latin typeface="Audiowide" panose="02000503000000020004" pitchFamily="2" charset="0"/>
+              </a:rPr>
+              <a:t>IMU Module</a:t>
+            </a:r>
+          </a:p>
+        </p:txBody>
+      </p:sp>
     </p:spTree>
     <p:extLst>
       <p:ext uri="{BB962C8B-B14F-4D97-AF65-F5344CB8AC3E}">
-        <p14:creationId xmlns:p14="http://schemas.microsoft.com/office/powerpoint/2010/main" val="713362904"/>
+        <p14:creationId xmlns:p14="http://schemas.microsoft.com/office/powerpoint/2010/main" val="2682499299"/>
       </p:ext>
     </p:extLst>
   </p:cSld>

</xml_diff>